<commit_message>
minor update to 'load' page
</commit_message>
<xml_diff>
--- a/ETL Project -Final.pptx
+++ b/ETL Project -Final.pptx
@@ -19924,9 +19924,9 @@
         <p:grpSpPr>
           <a:xfrm>
             <a:off x="1390386" y="1647992"/>
-            <a:ext cx="3197225" cy="866206"/>
+            <a:ext cx="3489601" cy="2343816"/>
             <a:chOff x="764723" y="2072994"/>
-            <a:chExt cx="3197225" cy="866206"/>
+            <a:chExt cx="3489601" cy="2343816"/>
           </a:xfrm>
         </p:grpSpPr>
         <p:sp>
@@ -20050,7 +20050,7 @@
           </p:nvSpPr>
           <p:spPr>
             <a:xfrm>
-              <a:off x="1435200" y="2493388"/>
+              <a:off x="1727576" y="4109033"/>
               <a:ext cx="2526748" cy="307777"/>
             </a:xfrm>
             <a:prstGeom prst="rect">
@@ -20074,7 +20074,7 @@
                   </a:solidFill>
                   <a:latin typeface="Tw Cen MT" panose="020B0602020104020603" pitchFamily="34" charset="0"/>
                 </a:rPr>
-                <a:t>Primary Key</a:t>
+                <a:t>Composite Primary Keys</a:t>
               </a:r>
             </a:p>
           </p:txBody>
@@ -20238,7 +20238,7 @@
         </p:blipFill>
         <p:spPr>
           <a:xfrm>
-            <a:off x="2414138" y="2642992"/>
+            <a:off x="2393123" y="4020115"/>
             <a:ext cx="5219414" cy="996046"/>
           </a:xfrm>
           <a:prstGeom prst="rect">
@@ -20276,6 +20276,36 @@
           <a:xfrm>
             <a:off x="9115484" y="3293032"/>
             <a:ext cx="346006" cy="346006"/>
+          </a:xfrm>
+          <a:prstGeom prst="rect">
+            <a:avLst/>
+          </a:prstGeom>
+        </p:spPr>
+      </p:pic>
+      <p:pic>
+        <p:nvPicPr>
+          <p:cNvPr id="4" name="Picture 3">
+            <a:extLst>
+              <a:ext uri="{FF2B5EF4-FFF2-40B4-BE49-F238E27FC236}">
+                <a16:creationId xmlns:a16="http://schemas.microsoft.com/office/drawing/2014/main" id="{6524D74C-7E88-4D67-B985-122BA6340955}"/>
+              </a:ext>
+            </a:extLst>
+          </p:cNvPr>
+          <p:cNvPicPr>
+            <a:picLocks noChangeAspect="1"/>
+          </p:cNvPicPr>
+          <p:nvPr/>
+        </p:nvPicPr>
+        <p:blipFill>
+          <a:blip r:embed="rId5"/>
+          <a:stretch>
+            <a:fillRect/>
+          </a:stretch>
+        </p:blipFill>
+        <p:spPr>
+          <a:xfrm>
+            <a:off x="2388282" y="2226295"/>
+            <a:ext cx="1628775" cy="895350"/>
           </a:xfrm>
           <a:prstGeom prst="rect">
             <a:avLst/>

</xml_diff>